<commit_message>
history graph, introduce AppPrefrence
</commit_message>
<xml_diff>
--- a/תכנון/מסך מטבעות.pptx
+++ b/תכנון/מסך מטבעות.pptx
@@ -6,7 +6,8 @@
   </p:sldMasterIdLst>
   <p:sldIdLst>
     <p:sldId id="256" r:id="rId2"/>
-    <p:sldId id="257" r:id="rId3"/>
+    <p:sldId id="258" r:id="rId3"/>
+    <p:sldId id="257" r:id="rId4"/>
   </p:sldIdLst>
   <p:sldSz cx="12192000" cy="6858000"/>
   <p:notesSz cx="6858000" cy="9144000"/>
@@ -244,7 +245,7 @@
           <a:p>
             <a:fld id="{FF0D1806-9825-4AFB-91F2-24417BBBBBD8}" type="datetimeFigureOut">
               <a:rPr lang="he-IL" smtClean="0"/>
-              <a:t>כ"ח/תשרי/תשע"ח</a:t>
+              <a:t>י"ח/חשון/תשע"ח</a:t>
             </a:fld>
             <a:endParaRPr lang="he-IL"/>
           </a:p>
@@ -414,7 +415,7 @@
           <a:p>
             <a:fld id="{FF0D1806-9825-4AFB-91F2-24417BBBBBD8}" type="datetimeFigureOut">
               <a:rPr lang="he-IL" smtClean="0"/>
-              <a:t>כ"ח/תשרי/תשע"ח</a:t>
+              <a:t>י"ח/חשון/תשע"ח</a:t>
             </a:fld>
             <a:endParaRPr lang="he-IL"/>
           </a:p>
@@ -594,7 +595,7 @@
           <a:p>
             <a:fld id="{FF0D1806-9825-4AFB-91F2-24417BBBBBD8}" type="datetimeFigureOut">
               <a:rPr lang="he-IL" smtClean="0"/>
-              <a:t>כ"ח/תשרי/תשע"ח</a:t>
+              <a:t>י"ח/חשון/תשע"ח</a:t>
             </a:fld>
             <a:endParaRPr lang="he-IL"/>
           </a:p>
@@ -764,7 +765,7 @@
           <a:p>
             <a:fld id="{FF0D1806-9825-4AFB-91F2-24417BBBBBD8}" type="datetimeFigureOut">
               <a:rPr lang="he-IL" smtClean="0"/>
-              <a:t>כ"ח/תשרי/תשע"ח</a:t>
+              <a:t>י"ח/חשון/תשע"ח</a:t>
             </a:fld>
             <a:endParaRPr lang="he-IL"/>
           </a:p>
@@ -1010,7 +1011,7 @@
           <a:p>
             <a:fld id="{FF0D1806-9825-4AFB-91F2-24417BBBBBD8}" type="datetimeFigureOut">
               <a:rPr lang="he-IL" smtClean="0"/>
-              <a:t>כ"ח/תשרי/תשע"ח</a:t>
+              <a:t>י"ח/חשון/תשע"ח</a:t>
             </a:fld>
             <a:endParaRPr lang="he-IL"/>
           </a:p>
@@ -1242,7 +1243,7 @@
           <a:p>
             <a:fld id="{FF0D1806-9825-4AFB-91F2-24417BBBBBD8}" type="datetimeFigureOut">
               <a:rPr lang="he-IL" smtClean="0"/>
-              <a:t>כ"ח/תשרי/תשע"ח</a:t>
+              <a:t>י"ח/חשון/תשע"ח</a:t>
             </a:fld>
             <a:endParaRPr lang="he-IL"/>
           </a:p>
@@ -1609,7 +1610,7 @@
           <a:p>
             <a:fld id="{FF0D1806-9825-4AFB-91F2-24417BBBBBD8}" type="datetimeFigureOut">
               <a:rPr lang="he-IL" smtClean="0"/>
-              <a:t>כ"ח/תשרי/תשע"ח</a:t>
+              <a:t>י"ח/חשון/תשע"ח</a:t>
             </a:fld>
             <a:endParaRPr lang="he-IL"/>
           </a:p>
@@ -1727,7 +1728,7 @@
           <a:p>
             <a:fld id="{FF0D1806-9825-4AFB-91F2-24417BBBBBD8}" type="datetimeFigureOut">
               <a:rPr lang="he-IL" smtClean="0"/>
-              <a:t>כ"ח/תשרי/תשע"ח</a:t>
+              <a:t>י"ח/חשון/תשע"ח</a:t>
             </a:fld>
             <a:endParaRPr lang="he-IL"/>
           </a:p>
@@ -1822,7 +1823,7 @@
           <a:p>
             <a:fld id="{FF0D1806-9825-4AFB-91F2-24417BBBBBD8}" type="datetimeFigureOut">
               <a:rPr lang="he-IL" smtClean="0"/>
-              <a:t>כ"ח/תשרי/תשע"ח</a:t>
+              <a:t>י"ח/חשון/תשע"ח</a:t>
             </a:fld>
             <a:endParaRPr lang="he-IL"/>
           </a:p>
@@ -2099,7 +2100,7 @@
           <a:p>
             <a:fld id="{FF0D1806-9825-4AFB-91F2-24417BBBBBD8}" type="datetimeFigureOut">
               <a:rPr lang="he-IL" smtClean="0"/>
-              <a:t>כ"ח/תשרי/תשע"ח</a:t>
+              <a:t>י"ח/חשון/תשע"ח</a:t>
             </a:fld>
             <a:endParaRPr lang="he-IL"/>
           </a:p>
@@ -2352,7 +2353,7 @@
           <a:p>
             <a:fld id="{FF0D1806-9825-4AFB-91F2-24417BBBBBD8}" type="datetimeFigureOut">
               <a:rPr lang="he-IL" smtClean="0"/>
-              <a:t>כ"ח/תשרי/תשע"ח</a:t>
+              <a:t>י"ח/חשון/תשע"ח</a:t>
             </a:fld>
             <a:endParaRPr lang="he-IL"/>
           </a:p>
@@ -2565,7 +2566,7 @@
           <a:p>
             <a:fld id="{FF0D1806-9825-4AFB-91F2-24417BBBBBD8}" type="datetimeFigureOut">
               <a:rPr lang="he-IL" smtClean="0"/>
-              <a:t>כ"ח/תשרי/תשע"ח</a:t>
+              <a:t>י"ח/חשון/תשע"ח</a:t>
             </a:fld>
             <a:endParaRPr lang="he-IL"/>
           </a:p>
@@ -3904,13 +3905,8 @@
             </a:r>
             <a:r>
               <a:rPr lang="en-US" dirty="0" smtClean="0"/>
-              <a:t>USD = </a:t>
-            </a:r>
-            <a:r>
-              <a:rPr lang="en-US" dirty="0" smtClean="0"/>
-              <a:t>4ILS(+/-)</a:t>
-            </a:r>
-            <a:endParaRPr lang="en-US" dirty="0" smtClean="0"/>
+              <a:t>USD = 4ILS(+/-)</a:t>
+            </a:r>
           </a:p>
           <a:p>
             <a:pPr algn="ctr" rtl="0"/>
@@ -3968,6 +3964,436 @@
       </p:grpSpPr>
       <p:sp>
         <p:nvSpPr>
+          <p:cNvPr id="4" name="מלבן 3"/>
+          <p:cNvSpPr/>
+          <p:nvPr/>
+        </p:nvSpPr>
+        <p:spPr>
+          <a:xfrm>
+            <a:off x="2866030" y="150125"/>
+            <a:ext cx="8065827" cy="5227093"/>
+          </a:xfrm>
+          <a:prstGeom prst="rect">
+            <a:avLst/>
+          </a:prstGeom>
+        </p:spPr>
+        <p:style>
+          <a:lnRef idx="2">
+            <a:schemeClr val="accent1">
+              <a:shade val="50000"/>
+            </a:schemeClr>
+          </a:lnRef>
+          <a:fillRef idx="1">
+            <a:schemeClr val="accent1"/>
+          </a:fillRef>
+          <a:effectRef idx="0">
+            <a:schemeClr val="accent1"/>
+          </a:effectRef>
+          <a:fontRef idx="minor">
+            <a:schemeClr val="lt1"/>
+          </a:fontRef>
+        </p:style>
+        <p:txBody>
+          <a:bodyPr rtlCol="1" anchor="ctr"/>
+          <a:lstStyle/>
+          <a:p>
+            <a:pPr algn="ctr"/>
+            <a:endParaRPr lang="he-IL"/>
+          </a:p>
+        </p:txBody>
+      </p:sp>
+      <p:sp>
+        <p:nvSpPr>
+          <p:cNvPr id="5" name="מלבן 4"/>
+          <p:cNvSpPr/>
+          <p:nvPr/>
+        </p:nvSpPr>
+        <p:spPr>
+          <a:xfrm>
+            <a:off x="3425588" y="545910"/>
+            <a:ext cx="1978925" cy="4094329"/>
+          </a:xfrm>
+          <a:prstGeom prst="rect">
+            <a:avLst/>
+          </a:prstGeom>
+          <a:solidFill>
+            <a:schemeClr val="accent2">
+              <a:lumMod val="20000"/>
+              <a:lumOff val="80000"/>
+            </a:schemeClr>
+          </a:solidFill>
+        </p:spPr>
+        <p:style>
+          <a:lnRef idx="2">
+            <a:schemeClr val="accent1">
+              <a:shade val="50000"/>
+            </a:schemeClr>
+          </a:lnRef>
+          <a:fillRef idx="1">
+            <a:schemeClr val="accent1"/>
+          </a:fillRef>
+          <a:effectRef idx="0">
+            <a:schemeClr val="accent1"/>
+          </a:effectRef>
+          <a:fontRef idx="minor">
+            <a:schemeClr val="lt1"/>
+          </a:fontRef>
+        </p:style>
+        <p:txBody>
+          <a:bodyPr rtlCol="1" anchor="ctr"/>
+          <a:lstStyle/>
+          <a:p>
+            <a:pPr algn="ctr"/>
+            <a:endParaRPr lang="he-IL"/>
+          </a:p>
+        </p:txBody>
+      </p:sp>
+      <p:sp>
+        <p:nvSpPr>
+          <p:cNvPr id="6" name="מלבן 5"/>
+          <p:cNvSpPr/>
+          <p:nvPr/>
+        </p:nvSpPr>
+        <p:spPr>
+          <a:xfrm>
+            <a:off x="5759355" y="545910"/>
+            <a:ext cx="2408829" cy="4094329"/>
+          </a:xfrm>
+          <a:prstGeom prst="rect">
+            <a:avLst/>
+          </a:prstGeom>
+          <a:solidFill>
+            <a:schemeClr val="accent2">
+              <a:lumMod val="20000"/>
+              <a:lumOff val="80000"/>
+            </a:schemeClr>
+          </a:solidFill>
+        </p:spPr>
+        <p:style>
+          <a:lnRef idx="2">
+            <a:schemeClr val="accent1">
+              <a:shade val="50000"/>
+            </a:schemeClr>
+          </a:lnRef>
+          <a:fillRef idx="1">
+            <a:schemeClr val="accent1"/>
+          </a:fillRef>
+          <a:effectRef idx="0">
+            <a:schemeClr val="accent1"/>
+          </a:effectRef>
+          <a:fontRef idx="minor">
+            <a:schemeClr val="lt1"/>
+          </a:fontRef>
+        </p:style>
+        <p:txBody>
+          <a:bodyPr rtlCol="1" anchor="ctr"/>
+          <a:lstStyle/>
+          <a:p>
+            <a:pPr algn="ctr"/>
+            <a:endParaRPr lang="he-IL" dirty="0"/>
+          </a:p>
+        </p:txBody>
+      </p:sp>
+      <p:sp>
+        <p:nvSpPr>
+          <p:cNvPr id="7" name="מלבן 6"/>
+          <p:cNvSpPr/>
+          <p:nvPr/>
+        </p:nvSpPr>
+        <p:spPr>
+          <a:xfrm>
+            <a:off x="8352430" y="545910"/>
+            <a:ext cx="2187053" cy="4094329"/>
+          </a:xfrm>
+          <a:prstGeom prst="rect">
+            <a:avLst/>
+          </a:prstGeom>
+          <a:solidFill>
+            <a:schemeClr val="accent2">
+              <a:lumMod val="20000"/>
+              <a:lumOff val="80000"/>
+            </a:schemeClr>
+          </a:solidFill>
+        </p:spPr>
+        <p:style>
+          <a:lnRef idx="2">
+            <a:schemeClr val="accent1">
+              <a:shade val="50000"/>
+            </a:schemeClr>
+          </a:lnRef>
+          <a:fillRef idx="1">
+            <a:schemeClr val="accent1"/>
+          </a:fillRef>
+          <a:effectRef idx="0">
+            <a:schemeClr val="accent1"/>
+          </a:effectRef>
+          <a:fontRef idx="minor">
+            <a:schemeClr val="lt1"/>
+          </a:fontRef>
+        </p:style>
+        <p:txBody>
+          <a:bodyPr rtlCol="1" anchor="ctr"/>
+          <a:lstStyle/>
+          <a:p>
+            <a:pPr algn="ctr" rtl="0"/>
+            <a:endParaRPr lang="he-IL" dirty="0"/>
+          </a:p>
+        </p:txBody>
+      </p:sp>
+      <p:sp>
+        <p:nvSpPr>
+          <p:cNvPr id="8" name="TextBox 7"/>
+          <p:cNvSpPr txBox="1"/>
+          <p:nvPr/>
+        </p:nvSpPr>
+        <p:spPr>
+          <a:xfrm>
+            <a:off x="6182436" y="941696"/>
+            <a:ext cx="1637731" cy="369332"/>
+          </a:xfrm>
+          <a:prstGeom prst="rect">
+            <a:avLst/>
+          </a:prstGeom>
+          <a:noFill/>
+        </p:spPr>
+        <p:txBody>
+          <a:bodyPr wrap="square" rtlCol="1">
+            <a:spAutoFit/>
+          </a:bodyPr>
+          <a:lstStyle/>
+          <a:p>
+            <a:r>
+              <a:rPr lang="en-US" dirty="0" err="1" smtClean="0"/>
+              <a:t>Akuo</a:t>
+            </a:r>
+            <a:r>
+              <a:rPr lang="he-IL" dirty="0" smtClean="0"/>
+              <a:t>  של</a:t>
+            </a:r>
+            <a:endParaRPr lang="he-IL" dirty="0"/>
+          </a:p>
+        </p:txBody>
+      </p:sp>
+      <p:sp>
+        <p:nvSpPr>
+          <p:cNvPr id="9" name="TextBox 8"/>
+          <p:cNvSpPr txBox="1"/>
+          <p:nvPr/>
+        </p:nvSpPr>
+        <p:spPr>
+          <a:xfrm>
+            <a:off x="8901752" y="941696"/>
+            <a:ext cx="1637731" cy="369332"/>
+          </a:xfrm>
+          <a:prstGeom prst="rect">
+            <a:avLst/>
+          </a:prstGeom>
+          <a:noFill/>
+        </p:spPr>
+        <p:txBody>
+          <a:bodyPr wrap="square" rtlCol="1">
+            <a:spAutoFit/>
+          </a:bodyPr>
+          <a:lstStyle/>
+          <a:p>
+            <a:r>
+              <a:rPr lang="en-US" dirty="0" err="1" smtClean="0"/>
+              <a:t>Akuo</a:t>
+            </a:r>
+            <a:r>
+              <a:rPr lang="he-IL" dirty="0" smtClean="0"/>
+              <a:t>  של</a:t>
+            </a:r>
+            <a:endParaRPr lang="he-IL" dirty="0"/>
+          </a:p>
+        </p:txBody>
+      </p:sp>
+      <p:sp>
+        <p:nvSpPr>
+          <p:cNvPr id="10" name="TextBox 9"/>
+          <p:cNvSpPr txBox="1"/>
+          <p:nvPr/>
+        </p:nvSpPr>
+        <p:spPr>
+          <a:xfrm>
+            <a:off x="3514299" y="941696"/>
+            <a:ext cx="1637731" cy="369332"/>
+          </a:xfrm>
+          <a:prstGeom prst="rect">
+            <a:avLst/>
+          </a:prstGeom>
+          <a:noFill/>
+        </p:spPr>
+        <p:txBody>
+          <a:bodyPr wrap="square" rtlCol="1">
+            <a:spAutoFit/>
+          </a:bodyPr>
+          <a:lstStyle/>
+          <a:p>
+            <a:r>
+              <a:rPr lang="en-US" dirty="0" err="1" smtClean="0"/>
+              <a:t>Akuo</a:t>
+            </a:r>
+            <a:r>
+              <a:rPr lang="he-IL" dirty="0" smtClean="0"/>
+              <a:t>  של</a:t>
+            </a:r>
+            <a:endParaRPr lang="he-IL" dirty="0"/>
+          </a:p>
+        </p:txBody>
+      </p:sp>
+      <p:sp>
+        <p:nvSpPr>
+          <p:cNvPr id="11" name="מלבן 10"/>
+          <p:cNvSpPr/>
+          <p:nvPr/>
+        </p:nvSpPr>
+        <p:spPr>
+          <a:xfrm>
+            <a:off x="3725839" y="1706813"/>
+            <a:ext cx="1426191" cy="2592232"/>
+          </a:xfrm>
+          <a:prstGeom prst="rect">
+            <a:avLst/>
+          </a:prstGeom>
+        </p:spPr>
+        <p:style>
+          <a:lnRef idx="2">
+            <a:schemeClr val="accent1">
+              <a:shade val="50000"/>
+            </a:schemeClr>
+          </a:lnRef>
+          <a:fillRef idx="1">
+            <a:schemeClr val="accent1"/>
+          </a:fillRef>
+          <a:effectRef idx="0">
+            <a:schemeClr val="accent1"/>
+          </a:effectRef>
+          <a:fontRef idx="minor">
+            <a:schemeClr val="lt1"/>
+          </a:fontRef>
+        </p:style>
+        <p:txBody>
+          <a:bodyPr rtlCol="1" anchor="ctr"/>
+          <a:lstStyle/>
+          <a:p>
+            <a:pPr algn="ctr"/>
+            <a:endParaRPr lang="he-IL"/>
+          </a:p>
+        </p:txBody>
+      </p:sp>
+      <p:sp>
+        <p:nvSpPr>
+          <p:cNvPr id="12" name="מלבן 11"/>
+          <p:cNvSpPr/>
+          <p:nvPr/>
+        </p:nvSpPr>
+        <p:spPr>
+          <a:xfrm>
+            <a:off x="6121021" y="1706813"/>
+            <a:ext cx="1426191" cy="2592232"/>
+          </a:xfrm>
+          <a:prstGeom prst="rect">
+            <a:avLst/>
+          </a:prstGeom>
+        </p:spPr>
+        <p:style>
+          <a:lnRef idx="2">
+            <a:schemeClr val="accent1">
+              <a:shade val="50000"/>
+            </a:schemeClr>
+          </a:lnRef>
+          <a:fillRef idx="1">
+            <a:schemeClr val="accent1"/>
+          </a:fillRef>
+          <a:effectRef idx="0">
+            <a:schemeClr val="accent1"/>
+          </a:effectRef>
+          <a:fontRef idx="minor">
+            <a:schemeClr val="lt1"/>
+          </a:fontRef>
+        </p:style>
+        <p:txBody>
+          <a:bodyPr rtlCol="1" anchor="ctr"/>
+          <a:lstStyle/>
+          <a:p>
+            <a:pPr algn="ctr"/>
+            <a:endParaRPr lang="he-IL"/>
+          </a:p>
+        </p:txBody>
+      </p:sp>
+      <p:sp>
+        <p:nvSpPr>
+          <p:cNvPr id="13" name="מלבן 12"/>
+          <p:cNvSpPr/>
+          <p:nvPr/>
+        </p:nvSpPr>
+        <p:spPr>
+          <a:xfrm>
+            <a:off x="8732860" y="1706813"/>
+            <a:ext cx="1426191" cy="2592232"/>
+          </a:xfrm>
+          <a:prstGeom prst="rect">
+            <a:avLst/>
+          </a:prstGeom>
+        </p:spPr>
+        <p:style>
+          <a:lnRef idx="2">
+            <a:schemeClr val="accent1">
+              <a:shade val="50000"/>
+            </a:schemeClr>
+          </a:lnRef>
+          <a:fillRef idx="1">
+            <a:schemeClr val="accent1"/>
+          </a:fillRef>
+          <a:effectRef idx="0">
+            <a:schemeClr val="accent1"/>
+          </a:effectRef>
+          <a:fontRef idx="minor">
+            <a:schemeClr val="lt1"/>
+          </a:fontRef>
+        </p:style>
+        <p:txBody>
+          <a:bodyPr rtlCol="1" anchor="ctr"/>
+          <a:lstStyle/>
+          <a:p>
+            <a:pPr algn="ctr" rtl="0"/>
+            <a:endParaRPr lang="he-IL" dirty="0"/>
+          </a:p>
+        </p:txBody>
+      </p:sp>
+    </p:spTree>
+    <p:extLst>
+      <p:ext uri="{BB962C8B-B14F-4D97-AF65-F5344CB8AC3E}">
+        <p14:creationId xmlns:p14="http://schemas.microsoft.com/office/powerpoint/2010/main" val="609188252"/>
+      </p:ext>
+    </p:extLst>
+  </p:cSld>
+  <p:clrMapOvr>
+    <a:masterClrMapping/>
+  </p:clrMapOvr>
+</p:sld>
+</file>
+
+<file path=ppt/slides/slide3.xml><?xml version="1.0" encoding="utf-8"?>
+<p:sld xmlns:a="http://schemas.openxmlformats.org/drawingml/2006/main" xmlns:r="http://schemas.openxmlformats.org/officeDocument/2006/relationships" xmlns:p="http://schemas.openxmlformats.org/presentationml/2006/main">
+  <p:cSld>
+    <p:spTree>
+      <p:nvGrpSpPr>
+        <p:cNvPr id="1" name=""/>
+        <p:cNvGrpSpPr/>
+        <p:nvPr/>
+      </p:nvGrpSpPr>
+      <p:grpSpPr>
+        <a:xfrm>
+          <a:off x="0" y="0"/>
+          <a:ext cx="0" cy="0"/>
+          <a:chOff x="0" y="0"/>
+          <a:chExt cx="0" cy="0"/>
+        </a:xfrm>
+      </p:grpSpPr>
+      <p:sp>
+        <p:nvSpPr>
           <p:cNvPr id="2" name="כותרת 1"/>
           <p:cNvSpPr>
             <a:spLocks noGrp="1"/>
@@ -4080,7 +4506,6 @@
               <a:rPr lang="he-IL" dirty="0" smtClean="0"/>
               <a:t>&gt;</a:t>
             </a:r>
-            <a:endParaRPr lang="he-IL" dirty="0" smtClean="0"/>
           </a:p>
           <a:p>
             <a:pPr marL="285750" indent="-285750">
@@ -4089,11 +4514,7 @@
             </a:pPr>
             <a:r>
               <a:rPr lang="he-IL" dirty="0" smtClean="0"/>
-              <a:t>עדכון על </a:t>
-            </a:r>
-            <a:r>
-              <a:rPr lang="he-IL" dirty="0" smtClean="0"/>
-              <a:t>עדכונים של שער חי</a:t>
+              <a:t>עדכון על עדכונים של שער חי</a:t>
             </a:r>
           </a:p>
           <a:p>

</xml_diff>